<commit_message>
Add figure of feedforward in README
</commit_message>
<xml_diff>
--- a/docs/src/assets/figures.pptx
+++ b/docs/src/assets/figures.pptx
@@ -3832,14 +3832,14 @@
       </p:grpSpPr>
       <p:sp>
         <p:nvSpPr>
-          <p:cNvPr id="10" name="正方形/長方形 9"/>
+          <p:cNvPr id="55" name="正方形/長方形 54"/>
           <p:cNvSpPr/>
           <p:nvPr/>
         </p:nvSpPr>
         <p:spPr>
-          <a:xfrm>
-            <a:off x="977833" y="2122843"/>
-            <a:ext cx="1439730" cy="441063"/>
+          <a:xfrm rot="5400000">
+            <a:off x="812299" y="2014024"/>
+            <a:ext cx="280939" cy="720762"/>
           </a:xfrm>
           <a:prstGeom prst="rect">
             <a:avLst/>
@@ -3847,8 +3847,10 @@
           <a:solidFill>
             <a:srgbClr val="00B0F0"/>
           </a:solidFill>
-          <a:ln>
-            <a:noFill/>
+          <a:ln w="25400">
+            <a:solidFill>
+              <a:schemeClr val="tx1"/>
+            </a:solidFill>
           </a:ln>
         </p:spPr>
         <p:style>
@@ -3872,27 +3874,53 @@
           <a:lstStyle/>
           <a:p>
             <a:pPr algn="ctr"/>
-            <a:r>
-              <a:rPr kumimoji="1" lang="en-US" altLang="ja-JP" sz="2400" dirty="0" smtClean="0"/>
-              <a:t>h1</a:t>
-            </a:r>
-            <a:endParaRPr kumimoji="1" lang="ja-JP" altLang="en-US" sz="2400" dirty="0"/>
+            <a:endParaRPr kumimoji="1" lang="ja-JP" altLang="en-US"/>
+          </a:p>
+        </p:txBody>
+      </p:sp>
+      <p:sp>
+        <p:nvSpPr>
+          <p:cNvPr id="56" name="正方形/長方形 55"/>
+          <p:cNvSpPr/>
+          <p:nvPr/>
+        </p:nvSpPr>
+        <p:spPr>
+          <a:xfrm>
+            <a:off x="793910" y="2967335"/>
+            <a:ext cx="317715" cy="461665"/>
+          </a:xfrm>
+          <a:prstGeom prst="rect">
+            <a:avLst/>
+          </a:prstGeom>
+        </p:spPr>
+        <p:txBody>
+          <a:bodyPr wrap="none">
+            <a:spAutoFit/>
+          </a:bodyPr>
+          <a:lstStyle/>
+          <a:p>
+            <a:pPr algn="ctr"/>
+            <a:r>
+              <a:rPr lang="en-US" altLang="ja-JP" sz="2400" dirty="0" smtClean="0"/>
+              <a:t>x</a:t>
+            </a:r>
+            <a:endParaRPr lang="ja-JP" altLang="en-US" sz="2400" dirty="0"/>
           </a:p>
         </p:txBody>
       </p:sp>
       <p:cxnSp>
         <p:nvCxnSpPr>
-          <p:cNvPr id="3" name="直線矢印コネクタ 2"/>
+          <p:cNvPr id="57" name="直線矢印コネクタ 56"/>
           <p:cNvCxnSpPr>
-            <a:stCxn id="9" idx="0"/>
-            <a:endCxn id="10" idx="2"/>
+            <a:stCxn id="56" idx="0"/>
+            <a:endCxn id="55" idx="3"/>
           </p:cNvCxnSpPr>
           <p:nvPr/>
         </p:nvCxnSpPr>
         <p:spPr>
           <a:xfrm flipV="1">
-            <a:off x="1697698" y="2563906"/>
-            <a:ext cx="0" cy="424031"/>
+            <a:off x="952768" y="2514875"/>
+            <a:ext cx="1" cy="452460"/>
           </a:xfrm>
           <a:prstGeom prst="straightConnector1">
             <a:avLst/>
@@ -3901,7 +3929,7 @@
             <a:solidFill>
               <a:schemeClr val="tx1"/>
             </a:solidFill>
-            <a:tailEnd type="triangle"/>
+            <a:tailEnd type="arrow"/>
           </a:ln>
         </p:spPr>
         <p:style>
@@ -3921,14 +3949,44 @@
       </p:cxnSp>
       <p:sp>
         <p:nvSpPr>
-          <p:cNvPr id="14" name="正方形/長方形 13"/>
+          <p:cNvPr id="62" name="正方形/長方形 61"/>
           <p:cNvSpPr/>
           <p:nvPr/>
         </p:nvSpPr>
         <p:spPr>
           <a:xfrm>
-            <a:off x="977833" y="1257749"/>
-            <a:ext cx="1439730" cy="441063"/>
+            <a:off x="1313149" y="2521415"/>
+            <a:ext cx="955711" cy="461665"/>
+          </a:xfrm>
+          <a:prstGeom prst="rect">
+            <a:avLst/>
+          </a:prstGeom>
+        </p:spPr>
+        <p:txBody>
+          <a:bodyPr wrap="none">
+            <a:spAutoFit/>
+          </a:bodyPr>
+          <a:lstStyle/>
+          <a:p>
+            <a:pPr algn="ctr"/>
+            <a:r>
+              <a:rPr lang="en-US" altLang="ja-JP" sz="2400" dirty="0" smtClean="0"/>
+              <a:t>Linear</a:t>
+            </a:r>
+            <a:endParaRPr lang="ja-JP" altLang="en-US" sz="2400" dirty="0"/>
+          </a:p>
+        </p:txBody>
+      </p:sp>
+      <p:sp>
+        <p:nvSpPr>
+          <p:cNvPr id="72" name="正方形/長方形 71"/>
+          <p:cNvSpPr/>
+          <p:nvPr/>
+        </p:nvSpPr>
+        <p:spPr>
+          <a:xfrm rot="5400000">
+            <a:off x="812298" y="1260029"/>
+            <a:ext cx="280939" cy="720762"/>
           </a:xfrm>
           <a:prstGeom prst="rect">
             <a:avLst/>
@@ -3936,8 +3994,10 @@
           <a:solidFill>
             <a:srgbClr val="00B0F0"/>
           </a:solidFill>
-          <a:ln>
-            <a:noFill/>
+          <a:ln w="25400">
+            <a:solidFill>
+              <a:schemeClr val="tx1"/>
+            </a:solidFill>
           </a:ln>
         </p:spPr>
         <p:style>
@@ -3961,27 +4021,23 @@
           <a:lstStyle/>
           <a:p>
             <a:pPr algn="ctr"/>
-            <a:r>
-              <a:rPr kumimoji="1" lang="en-US" altLang="ja-JP" sz="2400" dirty="0" smtClean="0"/>
-              <a:t>h2</a:t>
-            </a:r>
-            <a:endParaRPr kumimoji="1" lang="ja-JP" altLang="en-US" sz="2400" dirty="0"/>
+            <a:endParaRPr kumimoji="1" lang="ja-JP" altLang="en-US"/>
           </a:p>
         </p:txBody>
       </p:sp>
       <p:cxnSp>
         <p:nvCxnSpPr>
-          <p:cNvPr id="15" name="直線矢印コネクタ 14"/>
+          <p:cNvPr id="73" name="直線矢印コネクタ 72"/>
           <p:cNvCxnSpPr>
-            <a:stCxn id="10" idx="0"/>
-            <a:endCxn id="14" idx="2"/>
+            <a:stCxn id="55" idx="1"/>
+            <a:endCxn id="72" idx="3"/>
           </p:cNvCxnSpPr>
           <p:nvPr/>
         </p:nvCxnSpPr>
         <p:spPr>
-          <a:xfrm flipV="1">
-            <a:off x="1697698" y="1698812"/>
-            <a:ext cx="0" cy="424031"/>
+          <a:xfrm flipH="1" flipV="1">
+            <a:off x="952768" y="1760880"/>
+            <a:ext cx="1" cy="473056"/>
           </a:xfrm>
           <a:prstGeom prst="straightConnector1">
             <a:avLst/>
@@ -3990,7 +4046,7 @@
             <a:solidFill>
               <a:schemeClr val="tx1"/>
             </a:solidFill>
-            <a:tailEnd type="triangle"/>
+            <a:tailEnd type="arrow"/>
           </a:ln>
         </p:spPr>
         <p:style>
@@ -4010,79 +4066,46 @@
       </p:cxnSp>
       <p:sp>
         <p:nvSpPr>
-          <p:cNvPr id="4" name="テキスト ボックス 3"/>
-          <p:cNvSpPr txBox="1"/>
+          <p:cNvPr id="74" name="正方形/長方形 73"/>
+          <p:cNvSpPr/>
           <p:nvPr/>
         </p:nvSpPr>
         <p:spPr>
           <a:xfrm>
-            <a:off x="2414871" y="2563906"/>
-            <a:ext cx="1021977" cy="461665"/>
+            <a:off x="1452930" y="1766575"/>
+            <a:ext cx="674352" cy="461665"/>
           </a:xfrm>
           <a:prstGeom prst="rect">
             <a:avLst/>
           </a:prstGeom>
-          <a:noFill/>
-        </p:spPr>
-        <p:txBody>
-          <a:bodyPr wrap="square" rtlCol="0">
+        </p:spPr>
+        <p:txBody>
+          <a:bodyPr wrap="none">
             <a:spAutoFit/>
           </a:bodyPr>
           <a:lstStyle/>
           <a:p>
-            <a:pPr algn="ctr"/>
-            <a:r>
-              <a:rPr kumimoji="1" lang="en-US" altLang="ja-JP" sz="2400" dirty="0" smtClean="0"/>
-              <a:t>Linear</a:t>
-            </a:r>
-            <a:endParaRPr kumimoji="1" lang="ja-JP" altLang="en-US" sz="2400" dirty="0"/>
-          </a:p>
-        </p:txBody>
-      </p:sp>
-      <p:sp>
-        <p:nvSpPr>
-          <p:cNvPr id="21" name="テキスト ボックス 20"/>
-          <p:cNvSpPr txBox="1"/>
-          <p:nvPr/>
-        </p:nvSpPr>
-        <p:spPr>
-          <a:xfrm>
-            <a:off x="2414872" y="1679995"/>
-            <a:ext cx="1021977" cy="461665"/>
-          </a:xfrm>
-          <a:prstGeom prst="rect">
-            <a:avLst/>
-          </a:prstGeom>
-          <a:noFill/>
-        </p:spPr>
-        <p:txBody>
-          <a:bodyPr wrap="square" rtlCol="0">
-            <a:spAutoFit/>
-          </a:bodyPr>
-          <a:lstStyle/>
-          <a:p>
-            <a:pPr algn="ctr"/>
-            <a:r>
-              <a:rPr kumimoji="1" lang="en-US" altLang="ja-JP" sz="2400" dirty="0" err="1" smtClean="0"/>
+            <a:r>
+              <a:rPr lang="en-US" altLang="ja-JP" sz="2400" dirty="0" err="1" smtClean="0"/>
               <a:t>relu</a:t>
             </a:r>
-            <a:endParaRPr kumimoji="1" lang="ja-JP" altLang="en-US" sz="2400" dirty="0"/>
+            <a:endParaRPr lang="ja-JP" altLang="en-US" sz="2400" dirty="0"/>
           </a:p>
         </p:txBody>
       </p:sp>
       <p:cxnSp>
         <p:nvCxnSpPr>
-          <p:cNvPr id="24" name="直線矢印コネクタ 23"/>
+          <p:cNvPr id="76" name="直線矢印コネクタ 75"/>
           <p:cNvCxnSpPr>
-            <a:stCxn id="14" idx="0"/>
-            <a:endCxn id="23" idx="2"/>
+            <a:stCxn id="72" idx="1"/>
+            <a:endCxn id="79" idx="2"/>
           </p:cNvCxnSpPr>
           <p:nvPr/>
         </p:nvCxnSpPr>
         <p:spPr>
           <a:xfrm flipH="1" flipV="1">
-            <a:off x="1695006" y="793809"/>
-            <a:ext cx="2692" cy="463940"/>
+            <a:off x="952767" y="998964"/>
+            <a:ext cx="1" cy="480977"/>
           </a:xfrm>
           <a:prstGeom prst="straightConnector1">
             <a:avLst/>
@@ -4091,7 +4114,7 @@
             <a:solidFill>
               <a:schemeClr val="tx1"/>
             </a:solidFill>
-            <a:tailEnd type="triangle"/>
+            <a:tailEnd type="arrow"/>
           </a:ln>
         </p:spPr>
         <p:style>
@@ -4111,587 +4134,61 @@
       </p:cxnSp>
       <p:sp>
         <p:nvSpPr>
-          <p:cNvPr id="26" name="テキスト ボックス 25"/>
-          <p:cNvSpPr txBox="1"/>
+          <p:cNvPr id="78" name="正方形/長方形 77"/>
+          <p:cNvSpPr/>
           <p:nvPr/>
         </p:nvSpPr>
         <p:spPr>
           <a:xfrm>
-            <a:off x="2432352" y="800997"/>
-            <a:ext cx="1021977" cy="461665"/>
+            <a:off x="1312251" y="998964"/>
+            <a:ext cx="955711" cy="461665"/>
           </a:xfrm>
           <a:prstGeom prst="rect">
             <a:avLst/>
           </a:prstGeom>
-          <a:noFill/>
-        </p:spPr>
-        <p:txBody>
-          <a:bodyPr wrap="square" rtlCol="0">
+        </p:spPr>
+        <p:txBody>
+          <a:bodyPr wrap="none">
             <a:spAutoFit/>
           </a:bodyPr>
           <a:lstStyle/>
           <a:p>
             <a:pPr algn="ctr"/>
             <a:r>
-              <a:rPr kumimoji="1" lang="en-US" altLang="ja-JP" sz="2400" dirty="0" smtClean="0"/>
+              <a:rPr lang="en-US" altLang="ja-JP" sz="2400" dirty="0" smtClean="0"/>
               <a:t>Linear</a:t>
             </a:r>
-            <a:endParaRPr kumimoji="1" lang="ja-JP" altLang="en-US" sz="2400" dirty="0"/>
-          </a:p>
-        </p:txBody>
-      </p:sp>
-      <p:sp>
-        <p:nvSpPr>
-          <p:cNvPr id="27" name="正方形/長方形 26"/>
+            <a:endParaRPr lang="ja-JP" altLang="en-US" sz="2400" dirty="0"/>
+          </a:p>
+        </p:txBody>
+      </p:sp>
+      <p:sp>
+        <p:nvSpPr>
+          <p:cNvPr id="79" name="正方形/長方形 78"/>
           <p:cNvSpPr/>
           <p:nvPr/>
         </p:nvSpPr>
         <p:spPr>
           <a:xfrm>
-            <a:off x="4572000" y="3692111"/>
-            <a:ext cx="505610" cy="1186496"/>
+            <a:off x="790703" y="537299"/>
+            <a:ext cx="324128" cy="461665"/>
           </a:xfrm>
           <a:prstGeom prst="rect">
             <a:avLst/>
           </a:prstGeom>
-          <a:solidFill>
-            <a:srgbClr val="00B0F0"/>
-          </a:solidFill>
-          <a:ln>
-            <a:noFill/>
-          </a:ln>
-        </p:spPr>
-        <p:style>
-          <a:lnRef idx="2">
-            <a:schemeClr val="accent1">
-              <a:shade val="50000"/>
-            </a:schemeClr>
-          </a:lnRef>
-          <a:fillRef idx="1">
-            <a:schemeClr val="accent1"/>
-          </a:fillRef>
-          <a:effectRef idx="0">
-            <a:schemeClr val="accent1"/>
-          </a:effectRef>
-          <a:fontRef idx="minor">
-            <a:schemeClr val="lt1"/>
-          </a:fontRef>
-        </p:style>
-        <p:txBody>
-          <a:bodyPr rtlCol="0" anchor="ctr"/>
-          <a:lstStyle/>
-          <a:p>
-            <a:pPr algn="ctr"/>
-            <a:r>
-              <a:rPr lang="en-US" altLang="ja-JP" sz="2400" dirty="0"/>
-              <a:t>h</a:t>
-            </a:r>
-            <a:r>
-              <a:rPr lang="en-US" altLang="ja-JP" sz="2400" dirty="0" smtClean="0"/>
-              <a:t>1</a:t>
-            </a:r>
-            <a:endParaRPr kumimoji="1" lang="ja-JP" altLang="en-US" sz="2400" dirty="0"/>
-          </a:p>
-        </p:txBody>
-      </p:sp>
-      <p:cxnSp>
-        <p:nvCxnSpPr>
-          <p:cNvPr id="29" name="直線矢印コネクタ 28"/>
-          <p:cNvCxnSpPr>
-            <a:stCxn id="27" idx="3"/>
-          </p:cNvCxnSpPr>
-          <p:nvPr/>
-        </p:nvCxnSpPr>
-        <p:spPr>
-          <a:xfrm>
-            <a:off x="5077610" y="4285359"/>
-            <a:ext cx="531156" cy="0"/>
-          </a:xfrm>
-          <a:prstGeom prst="straightConnector1">
-            <a:avLst/>
-          </a:prstGeom>
-          <a:ln w="31750">
-            <a:solidFill>
-              <a:schemeClr val="tx1"/>
-            </a:solidFill>
-            <a:tailEnd type="triangle"/>
-          </a:ln>
-        </p:spPr>
-        <p:style>
-          <a:lnRef idx="1">
-            <a:schemeClr val="accent1"/>
-          </a:lnRef>
-          <a:fillRef idx="0">
-            <a:schemeClr val="accent1"/>
-          </a:fillRef>
-          <a:effectRef idx="0">
-            <a:schemeClr val="accent1"/>
-          </a:effectRef>
-          <a:fontRef idx="minor">
-            <a:schemeClr val="tx1"/>
-          </a:fontRef>
-        </p:style>
-      </p:cxnSp>
-      <p:sp>
-        <p:nvSpPr>
-          <p:cNvPr id="37" name="正方形/長方形 36"/>
-          <p:cNvSpPr/>
-          <p:nvPr/>
-        </p:nvSpPr>
-        <p:spPr>
-          <a:xfrm>
-            <a:off x="7667508" y="3692111"/>
-            <a:ext cx="494852" cy="1186496"/>
-          </a:xfrm>
-          <a:prstGeom prst="rect">
-            <a:avLst/>
-          </a:prstGeom>
-          <a:solidFill>
-            <a:srgbClr val="00B0F0"/>
-          </a:solidFill>
-          <a:ln>
-            <a:noFill/>
-          </a:ln>
-        </p:spPr>
-        <p:style>
-          <a:lnRef idx="2">
-            <a:schemeClr val="accent1">
-              <a:shade val="50000"/>
-            </a:schemeClr>
-          </a:lnRef>
-          <a:fillRef idx="1">
-            <a:schemeClr val="accent1"/>
-          </a:fillRef>
-          <a:effectRef idx="0">
-            <a:schemeClr val="accent1"/>
-          </a:effectRef>
-          <a:fontRef idx="minor">
-            <a:schemeClr val="lt1"/>
-          </a:fontRef>
-        </p:style>
-        <p:txBody>
-          <a:bodyPr rtlCol="0" anchor="ctr"/>
-          <a:lstStyle/>
-          <a:p>
-            <a:pPr algn="ctr"/>
-            <a:r>
-              <a:rPr lang="en-US" altLang="ja-JP" sz="2400" dirty="0" smtClean="0"/>
-              <a:t>x</a:t>
-            </a:r>
-            <a:endParaRPr kumimoji="1" lang="ja-JP" altLang="en-US" sz="2400" dirty="0"/>
-          </a:p>
-        </p:txBody>
-      </p:sp>
-      <p:sp>
-        <p:nvSpPr>
-          <p:cNvPr id="43" name="テキスト ボックス 42"/>
-          <p:cNvSpPr txBox="1"/>
-          <p:nvPr/>
-        </p:nvSpPr>
-        <p:spPr>
-          <a:xfrm>
-            <a:off x="4504764" y="5444061"/>
-            <a:ext cx="629323" cy="461665"/>
-          </a:xfrm>
-          <a:prstGeom prst="rect">
-            <a:avLst/>
-          </a:prstGeom>
-          <a:noFill/>
-        </p:spPr>
-        <p:txBody>
-          <a:bodyPr wrap="square" rtlCol="0">
+        </p:spPr>
+        <p:txBody>
+          <a:bodyPr wrap="none">
             <a:spAutoFit/>
           </a:bodyPr>
           <a:lstStyle/>
           <a:p>
             <a:pPr algn="ctr"/>
             <a:r>
-              <a:rPr kumimoji="1" lang="en-US" altLang="ja-JP" sz="2400" dirty="0" smtClean="0"/>
-              <a:t>x1</a:t>
-            </a:r>
-            <a:endParaRPr kumimoji="1" lang="ja-JP" altLang="en-US" sz="2400" dirty="0"/>
-          </a:p>
-        </p:txBody>
-      </p:sp>
-      <p:cxnSp>
-        <p:nvCxnSpPr>
-          <p:cNvPr id="44" name="直線矢印コネクタ 43"/>
-          <p:cNvCxnSpPr>
-            <a:endCxn id="27" idx="2"/>
-          </p:cNvCxnSpPr>
-          <p:nvPr/>
-        </p:nvCxnSpPr>
-        <p:spPr>
-          <a:xfrm flipV="1">
-            <a:off x="4819426" y="4878607"/>
-            <a:ext cx="5379" cy="565454"/>
-          </a:xfrm>
-          <a:prstGeom prst="straightConnector1">
-            <a:avLst/>
-          </a:prstGeom>
-          <a:ln w="31750">
-            <a:solidFill>
-              <a:schemeClr val="tx1"/>
-            </a:solidFill>
-            <a:tailEnd type="triangle"/>
-          </a:ln>
-        </p:spPr>
-        <p:style>
-          <a:lnRef idx="1">
-            <a:schemeClr val="accent1"/>
-          </a:lnRef>
-          <a:fillRef idx="0">
-            <a:schemeClr val="accent1"/>
-          </a:fillRef>
-          <a:effectRef idx="0">
-            <a:schemeClr val="accent1"/>
-          </a:effectRef>
-          <a:fontRef idx="minor">
-            <a:schemeClr val="tx1"/>
-          </a:fontRef>
-        </p:style>
-      </p:cxnSp>
-      <p:cxnSp>
-        <p:nvCxnSpPr>
-          <p:cNvPr id="48" name="直線矢印コネクタ 47"/>
-          <p:cNvCxnSpPr>
-            <a:stCxn id="27" idx="0"/>
-          </p:cNvCxnSpPr>
-          <p:nvPr/>
-        </p:nvCxnSpPr>
-        <p:spPr>
-          <a:xfrm flipH="1" flipV="1">
-            <a:off x="4819425" y="3208468"/>
-            <a:ext cx="5380" cy="483643"/>
-          </a:xfrm>
-          <a:prstGeom prst="straightConnector1">
-            <a:avLst/>
-          </a:prstGeom>
-          <a:ln w="31750">
-            <a:solidFill>
-              <a:schemeClr val="tx1"/>
-            </a:solidFill>
-            <a:tailEnd type="triangle"/>
-          </a:ln>
-        </p:spPr>
-        <p:style>
-          <a:lnRef idx="1">
-            <a:schemeClr val="accent1"/>
-          </a:lnRef>
-          <a:fillRef idx="0">
-            <a:schemeClr val="accent1"/>
-          </a:fillRef>
-          <a:effectRef idx="0">
-            <a:schemeClr val="accent1"/>
-          </a:effectRef>
-          <a:fontRef idx="minor">
-            <a:schemeClr val="tx1"/>
-          </a:fontRef>
-        </p:style>
-      </p:cxnSp>
-      <p:sp>
-        <p:nvSpPr>
-          <p:cNvPr id="59" name="テキスト ボックス 58"/>
-          <p:cNvSpPr txBox="1"/>
-          <p:nvPr/>
-        </p:nvSpPr>
-        <p:spPr>
-          <a:xfrm>
-            <a:off x="4504764" y="2716887"/>
-            <a:ext cx="629323" cy="461665"/>
-          </a:xfrm>
-          <a:prstGeom prst="rect">
-            <a:avLst/>
-          </a:prstGeom>
-          <a:noFill/>
-        </p:spPr>
-        <p:txBody>
-          <a:bodyPr wrap="square" rtlCol="0">
-            <a:spAutoFit/>
-          </a:bodyPr>
-          <a:lstStyle/>
-          <a:p>
-            <a:pPr algn="ctr"/>
-            <a:r>
-              <a:rPr lang="en-US" altLang="ja-JP" sz="2400" dirty="0"/>
+              <a:rPr lang="en-US" altLang="ja-JP" sz="2400" dirty="0" smtClean="0"/>
               <a:t>y</a:t>
             </a:r>
-            <a:r>
-              <a:rPr kumimoji="1" lang="en-US" altLang="ja-JP" sz="2400" dirty="0" smtClean="0"/>
-              <a:t>1</a:t>
-            </a:r>
-            <a:endParaRPr kumimoji="1" lang="ja-JP" altLang="en-US" sz="2400" dirty="0"/>
-          </a:p>
-        </p:txBody>
-      </p:sp>
-      <p:sp>
-        <p:nvSpPr>
-          <p:cNvPr id="60" name="テキスト ボックス 59"/>
-          <p:cNvSpPr txBox="1"/>
-          <p:nvPr/>
-        </p:nvSpPr>
-        <p:spPr>
-          <a:xfrm>
-            <a:off x="1380344" y="3004969"/>
-            <a:ext cx="629323" cy="461665"/>
-          </a:xfrm>
-          <a:prstGeom prst="rect">
-            <a:avLst/>
-          </a:prstGeom>
-          <a:noFill/>
-        </p:spPr>
-        <p:txBody>
-          <a:bodyPr wrap="square" rtlCol="0">
-            <a:spAutoFit/>
-          </a:bodyPr>
-          <a:lstStyle/>
-          <a:p>
-            <a:pPr algn="ctr"/>
-            <a:r>
-              <a:rPr kumimoji="1" lang="en-US" altLang="ja-JP" sz="2400" dirty="0" smtClean="0"/>
-              <a:t>x</a:t>
-            </a:r>
-            <a:endParaRPr kumimoji="1" lang="ja-JP" altLang="en-US" sz="2400" dirty="0"/>
-          </a:p>
-        </p:txBody>
-      </p:sp>
-      <p:sp>
-        <p:nvSpPr>
-          <p:cNvPr id="61" name="テキスト ボックス 60"/>
-          <p:cNvSpPr txBox="1"/>
-          <p:nvPr/>
-        </p:nvSpPr>
-        <p:spPr>
-          <a:xfrm>
-            <a:off x="1378331" y="315112"/>
-            <a:ext cx="629323" cy="461665"/>
-          </a:xfrm>
-          <a:prstGeom prst="rect">
-            <a:avLst/>
-          </a:prstGeom>
-          <a:noFill/>
-        </p:spPr>
-        <p:txBody>
-          <a:bodyPr wrap="square" rtlCol="0">
-            <a:spAutoFit/>
-          </a:bodyPr>
-          <a:lstStyle/>
-          <a:p>
-            <a:pPr algn="ctr"/>
-            <a:r>
-              <a:rPr lang="en-US" altLang="ja-JP" sz="2400" dirty="0"/>
-              <a:t>y</a:t>
-            </a:r>
-            <a:endParaRPr kumimoji="1" lang="ja-JP" altLang="en-US" sz="2400" dirty="0"/>
-          </a:p>
-        </p:txBody>
-      </p:sp>
-      <p:cxnSp>
-        <p:nvCxnSpPr>
-          <p:cNvPr id="63" name="直線矢印コネクタ 62"/>
-          <p:cNvCxnSpPr/>
-          <p:nvPr/>
-        </p:nvCxnSpPr>
-        <p:spPr>
-          <a:xfrm>
-            <a:off x="6707613" y="1883584"/>
-            <a:ext cx="531156" cy="0"/>
-          </a:xfrm>
-          <a:prstGeom prst="straightConnector1">
-            <a:avLst/>
-          </a:prstGeom>
-          <a:ln w="31750">
-            <a:solidFill>
-              <a:schemeClr val="tx1"/>
-            </a:solidFill>
-            <a:tailEnd type="triangle"/>
-          </a:ln>
-        </p:spPr>
-        <p:style>
-          <a:lnRef idx="1">
-            <a:schemeClr val="accent1"/>
-          </a:lnRef>
-          <a:fillRef idx="0">
-            <a:schemeClr val="accent1"/>
-          </a:fillRef>
-          <a:effectRef idx="0">
-            <a:schemeClr val="accent1"/>
-          </a:effectRef>
-          <a:fontRef idx="minor">
-            <a:schemeClr val="tx1"/>
-          </a:fontRef>
-        </p:style>
-      </p:cxnSp>
-      <p:sp>
-        <p:nvSpPr>
-          <p:cNvPr id="64" name="テキスト ボックス 63"/>
-          <p:cNvSpPr txBox="1"/>
-          <p:nvPr/>
-        </p:nvSpPr>
-        <p:spPr>
-          <a:xfrm>
-            <a:off x="6134767" y="2601223"/>
-            <a:ext cx="629323" cy="461665"/>
-          </a:xfrm>
-          <a:prstGeom prst="rect">
-            <a:avLst/>
-          </a:prstGeom>
-          <a:noFill/>
-        </p:spPr>
-        <p:txBody>
-          <a:bodyPr wrap="square" rtlCol="0">
-            <a:spAutoFit/>
-          </a:bodyPr>
-          <a:lstStyle/>
-          <a:p>
-            <a:pPr algn="ctr"/>
-            <a:r>
-              <a:rPr kumimoji="1" lang="en-US" altLang="ja-JP" sz="2400" dirty="0" smtClean="0"/>
-              <a:t>x1</a:t>
-            </a:r>
-            <a:endParaRPr kumimoji="1" lang="ja-JP" altLang="en-US" sz="2400" dirty="0"/>
-          </a:p>
-        </p:txBody>
-      </p:sp>
-      <p:cxnSp>
-        <p:nvCxnSpPr>
-          <p:cNvPr id="65" name="直線矢印コネクタ 64"/>
-          <p:cNvCxnSpPr/>
-          <p:nvPr/>
-        </p:nvCxnSpPr>
-        <p:spPr>
-          <a:xfrm flipH="1" flipV="1">
-            <a:off x="6444049" y="2122843"/>
-            <a:ext cx="5380" cy="478380"/>
-          </a:xfrm>
-          <a:prstGeom prst="straightConnector1">
-            <a:avLst/>
-          </a:prstGeom>
-          <a:ln w="31750">
-            <a:solidFill>
-              <a:schemeClr val="tx1"/>
-            </a:solidFill>
-            <a:tailEnd type="triangle"/>
-          </a:ln>
-        </p:spPr>
-        <p:style>
-          <a:lnRef idx="1">
-            <a:schemeClr val="accent1"/>
-          </a:lnRef>
-          <a:fillRef idx="0">
-            <a:schemeClr val="accent1"/>
-          </a:fillRef>
-          <a:effectRef idx="0">
-            <a:schemeClr val="accent1"/>
-          </a:effectRef>
-          <a:fontRef idx="minor">
-            <a:schemeClr val="tx1"/>
-          </a:fontRef>
-        </p:style>
-      </p:cxnSp>
-      <p:cxnSp>
-        <p:nvCxnSpPr>
-          <p:cNvPr id="66" name="直線矢印コネクタ 65"/>
-          <p:cNvCxnSpPr/>
-          <p:nvPr/>
-        </p:nvCxnSpPr>
-        <p:spPr>
-          <a:xfrm flipH="1" flipV="1">
-            <a:off x="6422751" y="1105093"/>
-            <a:ext cx="5380" cy="483643"/>
-          </a:xfrm>
-          <a:prstGeom prst="straightConnector1">
-            <a:avLst/>
-          </a:prstGeom>
-          <a:ln w="31750">
-            <a:solidFill>
-              <a:schemeClr val="tx1"/>
-            </a:solidFill>
-            <a:tailEnd type="triangle"/>
-          </a:ln>
-        </p:spPr>
-        <p:style>
-          <a:lnRef idx="1">
-            <a:schemeClr val="accent1"/>
-          </a:lnRef>
-          <a:fillRef idx="0">
-            <a:schemeClr val="accent1"/>
-          </a:fillRef>
-          <a:effectRef idx="0">
-            <a:schemeClr val="accent1"/>
-          </a:effectRef>
-          <a:fontRef idx="minor">
-            <a:schemeClr val="tx1"/>
-          </a:fontRef>
-        </p:style>
-      </p:cxnSp>
-      <p:sp>
-        <p:nvSpPr>
-          <p:cNvPr id="67" name="テキスト ボックス 66"/>
-          <p:cNvSpPr txBox="1"/>
-          <p:nvPr/>
-        </p:nvSpPr>
-        <p:spPr>
-          <a:xfrm>
-            <a:off x="6134767" y="540117"/>
-            <a:ext cx="629323" cy="461665"/>
-          </a:xfrm>
-          <a:prstGeom prst="rect">
-            <a:avLst/>
-          </a:prstGeom>
-          <a:noFill/>
-        </p:spPr>
-        <p:txBody>
-          <a:bodyPr wrap="square" rtlCol="0">
-            <a:spAutoFit/>
-          </a:bodyPr>
-          <a:lstStyle/>
-          <a:p>
-            <a:pPr algn="ctr"/>
-            <a:r>
-              <a:rPr lang="en-US" altLang="ja-JP" sz="2400" dirty="0"/>
-              <a:t>y</a:t>
-            </a:r>
-            <a:r>
-              <a:rPr kumimoji="1" lang="en-US" altLang="ja-JP" sz="2400" dirty="0" smtClean="0"/>
-              <a:t>1</a:t>
-            </a:r>
-            <a:endParaRPr kumimoji="1" lang="ja-JP" altLang="en-US" sz="2400" dirty="0"/>
-          </a:p>
-        </p:txBody>
-      </p:sp>
-      <p:sp>
-        <p:nvSpPr>
-          <p:cNvPr id="68" name="テキスト ボックス 67"/>
-          <p:cNvSpPr txBox="1"/>
-          <p:nvPr/>
-        </p:nvSpPr>
-        <p:spPr>
-          <a:xfrm>
-            <a:off x="6134767" y="1624957"/>
-            <a:ext cx="629323" cy="461665"/>
-          </a:xfrm>
-          <a:prstGeom prst="rect">
-            <a:avLst/>
-          </a:prstGeom>
-          <a:noFill/>
-        </p:spPr>
-        <p:txBody>
-          <a:bodyPr wrap="square" rtlCol="0">
-            <a:spAutoFit/>
-          </a:bodyPr>
-          <a:lstStyle/>
-          <a:p>
-            <a:pPr algn="ctr"/>
-            <a:r>
-              <a:rPr lang="en-US" altLang="ja-JP" sz="2400" dirty="0"/>
-              <a:t>h</a:t>
-            </a:r>
-            <a:r>
-              <a:rPr kumimoji="1" lang="en-US" altLang="ja-JP" sz="2400" dirty="0" smtClean="0"/>
-              <a:t>1</a:t>
-            </a:r>
-            <a:endParaRPr kumimoji="1" lang="ja-JP" altLang="en-US" sz="2400" dirty="0"/>
+            <a:endParaRPr lang="ja-JP" altLang="en-US" sz="2400" dirty="0"/>
           </a:p>
         </p:txBody>
       </p:sp>

</xml_diff>